<commit_message>
adding volatility-based labeling technique
</commit_message>
<xml_diff>
--- a/assets/diagrams.pptx
+++ b/assets/diagrams.pptx
@@ -3415,7 +3415,7 @@
         </p:nvSpPr>
         <p:spPr>
           <a:xfrm>
-            <a:off x="4260273" y="2201142"/>
+            <a:off x="5839691" y="2092037"/>
             <a:ext cx="1835727" cy="2172150"/>
           </a:xfrm>
           <a:prstGeom prst="rect">
@@ -3459,8 +3459,8 @@
         </p:nvSpPr>
         <p:spPr>
           <a:xfrm>
-            <a:off x="2327564" y="2234047"/>
-            <a:ext cx="1427017" cy="2130135"/>
+            <a:off x="1745672" y="2124942"/>
+            <a:ext cx="3588328" cy="2130135"/>
           </a:xfrm>
           <a:prstGeom prst="rect">
             <a:avLst/>
@@ -3503,7 +3503,7 @@
         </p:nvSpPr>
         <p:spPr>
           <a:xfrm>
-            <a:off x="360218" y="2951019"/>
+            <a:off x="96981" y="2934904"/>
             <a:ext cx="1482437" cy="477982"/>
           </a:xfrm>
           <a:prstGeom prst="roundRect">
@@ -3550,7 +3550,7 @@
         </p:nvSpPr>
         <p:spPr>
           <a:xfrm>
-            <a:off x="2455721" y="2473038"/>
+            <a:off x="4035139" y="2363933"/>
             <a:ext cx="1104898" cy="477982"/>
           </a:xfrm>
           <a:prstGeom prst="roundRect">
@@ -3594,15 +3594,15 @@
           </p:cNvPr>
           <p:cNvCxnSpPr>
             <a:cxnSpLocks/>
-            <a:stCxn id="2" idx="3"/>
+            <a:stCxn id="70" idx="3"/>
             <a:endCxn id="3" idx="1"/>
           </p:cNvCxnSpPr>
           <p:nvPr/>
         </p:nvCxnSpPr>
         <p:spPr>
           <a:xfrm flipV="1">
-            <a:off x="1842655" y="2712029"/>
-            <a:ext cx="613066" cy="477981"/>
+            <a:off x="3628157" y="2602924"/>
+            <a:ext cx="406982" cy="570971"/>
           </a:xfrm>
           <a:prstGeom prst="straightConnector1">
             <a:avLst/>
@@ -3640,7 +3640,7 @@
         </p:nvSpPr>
         <p:spPr>
           <a:xfrm>
-            <a:off x="2466110" y="3667990"/>
+            <a:off x="4045528" y="3558885"/>
             <a:ext cx="1104899" cy="477982"/>
           </a:xfrm>
           <a:prstGeom prst="roundRect">
@@ -3684,15 +3684,15 @@
           </p:cNvPr>
           <p:cNvCxnSpPr>
             <a:cxnSpLocks/>
-            <a:stCxn id="2" idx="3"/>
+            <a:stCxn id="70" idx="3"/>
             <a:endCxn id="6" idx="1"/>
           </p:cNvCxnSpPr>
           <p:nvPr/>
         </p:nvCxnSpPr>
         <p:spPr>
           <a:xfrm>
-            <a:off x="1842655" y="3190010"/>
-            <a:ext cx="623455" cy="716971"/>
+            <a:off x="3628157" y="3173895"/>
+            <a:ext cx="417371" cy="623981"/>
           </a:xfrm>
           <a:prstGeom prst="straightConnector1">
             <a:avLst/>
@@ -3730,8 +3730,8 @@
         </p:nvSpPr>
         <p:spPr>
           <a:xfrm>
-            <a:off x="2251362" y="1652703"/>
-            <a:ext cx="1579419" cy="646331"/>
+            <a:off x="1745672" y="1478611"/>
+            <a:ext cx="3588328" cy="646331"/>
           </a:xfrm>
           <a:prstGeom prst="rect">
             <a:avLst/>
@@ -3773,7 +3773,7 @@
         </p:nvSpPr>
         <p:spPr>
           <a:xfrm>
-            <a:off x="4412672" y="2380725"/>
+            <a:off x="5992090" y="2271620"/>
             <a:ext cx="1433946" cy="477982"/>
           </a:xfrm>
           <a:prstGeom prst="roundRect">
@@ -3824,8 +3824,8 @@
         </p:nvCxnSpPr>
         <p:spPr>
           <a:xfrm flipV="1">
-            <a:off x="3754581" y="3287217"/>
-            <a:ext cx="505692" cy="11898"/>
+            <a:off x="5334000" y="3178112"/>
+            <a:ext cx="505691" cy="11898"/>
           </a:xfrm>
           <a:prstGeom prst="straightConnector1">
             <a:avLst/>
@@ -3863,7 +3863,7 @@
         </p:nvSpPr>
         <p:spPr>
           <a:xfrm>
-            <a:off x="6525492" y="3048226"/>
+            <a:off x="8104910" y="2939121"/>
             <a:ext cx="1704109" cy="477982"/>
           </a:xfrm>
           <a:prstGeom prst="roundRect">
@@ -3910,7 +3910,7 @@
         </p:nvSpPr>
         <p:spPr>
           <a:xfrm>
-            <a:off x="4412672" y="3070627"/>
+            <a:off x="5992090" y="2961522"/>
             <a:ext cx="1447801" cy="477982"/>
           </a:xfrm>
           <a:prstGeom prst="roundRect">
@@ -3957,7 +3957,7 @@
         </p:nvSpPr>
         <p:spPr>
           <a:xfrm>
-            <a:off x="4426526" y="3721676"/>
+            <a:off x="6005944" y="3612571"/>
             <a:ext cx="1447801" cy="477982"/>
           </a:xfrm>
           <a:prstGeom prst="roundRect">
@@ -4004,7 +4004,7 @@
         </p:nvSpPr>
         <p:spPr>
           <a:xfrm>
-            <a:off x="4260273" y="1828121"/>
+            <a:off x="5839691" y="1719016"/>
             <a:ext cx="1835727" cy="369332"/>
           </a:xfrm>
           <a:prstGeom prst="rect">
@@ -4040,7 +4040,7 @@
         </p:nvSpPr>
         <p:spPr>
           <a:xfrm>
-            <a:off x="4260272" y="4666834"/>
+            <a:off x="5839690" y="4557729"/>
             <a:ext cx="1835728" cy="477982"/>
           </a:xfrm>
           <a:prstGeom prst="roundRect">
@@ -4091,7 +4091,7 @@
         </p:nvCxnSpPr>
         <p:spPr>
           <a:xfrm flipV="1">
-            <a:off x="5178136" y="4373292"/>
+            <a:off x="6757554" y="4264187"/>
             <a:ext cx="1" cy="293542"/>
           </a:xfrm>
           <a:prstGeom prst="straightConnector1">
@@ -4140,7 +4140,7 @@
         </p:nvCxnSpPr>
         <p:spPr>
           <a:xfrm>
-            <a:off x="6096000" y="3287217"/>
+            <a:off x="7675418" y="3178112"/>
             <a:ext cx="429492" cy="0"/>
           </a:xfrm>
           <a:prstGeom prst="straightConnector1">
@@ -4179,7 +4179,7 @@
         </p:nvSpPr>
         <p:spPr>
           <a:xfrm>
-            <a:off x="8659093" y="3048226"/>
+            <a:off x="10238511" y="2939121"/>
             <a:ext cx="1704109" cy="477982"/>
           </a:xfrm>
           <a:prstGeom prst="roundRect">
@@ -4230,7 +4230,7 @@
         </p:nvCxnSpPr>
         <p:spPr>
           <a:xfrm>
-            <a:off x="8229601" y="3287217"/>
+            <a:off x="9809019" y="3178112"/>
             <a:ext cx="429492" cy="0"/>
           </a:xfrm>
           <a:prstGeom prst="straightConnector1">
@@ -4269,7 +4269,7 @@
         </p:nvSpPr>
         <p:spPr>
           <a:xfrm>
-            <a:off x="2327564" y="4666834"/>
+            <a:off x="2060860" y="4557729"/>
             <a:ext cx="1427017" cy="477982"/>
           </a:xfrm>
           <a:prstGeom prst="roundRect">
@@ -4314,14 +4314,14 @@
           <p:cNvCxnSpPr>
             <a:cxnSpLocks/>
             <a:stCxn id="62" idx="0"/>
-            <a:endCxn id="12" idx="2"/>
+            <a:endCxn id="70" idx="2"/>
           </p:cNvCxnSpPr>
           <p:nvPr/>
         </p:nvCxnSpPr>
         <p:spPr>
           <a:xfrm flipV="1">
-            <a:off x="3041073" y="4364182"/>
-            <a:ext cx="0" cy="302652"/>
+            <a:off x="2774369" y="3412886"/>
+            <a:ext cx="1" cy="1144843"/>
           </a:xfrm>
           <a:prstGeom prst="straightConnector1">
             <a:avLst/>
@@ -4345,6 +4345,96 @@
           </a:fillRef>
           <a:effectRef idx="0">
             <a:scrgbClr r="0" g="0" b="0"/>
+          </a:effectRef>
+          <a:fontRef idx="minor">
+            <a:schemeClr val="tx1"/>
+          </a:fontRef>
+        </p:style>
+      </p:cxnSp>
+      <p:sp>
+        <p:nvSpPr>
+          <p:cNvPr id="70" name="Rounded Rectangle 69">
+            <a:extLst>
+              <a:ext uri="{FF2B5EF4-FFF2-40B4-BE49-F238E27FC236}">
+                <a16:creationId xmlns:a16="http://schemas.microsoft.com/office/drawing/2014/main" id="{D5BBB476-D862-9630-98F3-CD1D1238A3CA}"/>
+              </a:ext>
+            </a:extLst>
+          </p:cNvPr>
+          <p:cNvSpPr/>
+          <p:nvPr/>
+        </p:nvSpPr>
+        <p:spPr>
+          <a:xfrm>
+            <a:off x="1920582" y="2934904"/>
+            <a:ext cx="1707575" cy="477982"/>
+          </a:xfrm>
+          <a:prstGeom prst="roundRect">
+            <a:avLst/>
+          </a:prstGeom>
+        </p:spPr>
+        <p:style>
+          <a:lnRef idx="1">
+            <a:schemeClr val="accent3"/>
+          </a:lnRef>
+          <a:fillRef idx="2">
+            <a:schemeClr val="accent3"/>
+          </a:fillRef>
+          <a:effectRef idx="1">
+            <a:schemeClr val="accent3"/>
+          </a:effectRef>
+          <a:fontRef idx="minor">
+            <a:schemeClr val="dk1"/>
+          </a:fontRef>
+        </p:style>
+        <p:txBody>
+          <a:bodyPr rtlCol="0" anchor="ctr"/>
+          <a:lstStyle/>
+          <a:p>
+            <a:pPr algn="ctr"/>
+            <a:r>
+              <a:rPr lang="en-BR" dirty="0"/>
+              <a:t>Data standardization</a:t>
+            </a:r>
+          </a:p>
+        </p:txBody>
+      </p:sp>
+      <p:cxnSp>
+        <p:nvCxnSpPr>
+          <p:cNvPr id="76" name="Straight Arrow Connector 75">
+            <a:extLst>
+              <a:ext uri="{FF2B5EF4-FFF2-40B4-BE49-F238E27FC236}">
+                <a16:creationId xmlns:a16="http://schemas.microsoft.com/office/drawing/2014/main" id="{32DBE37E-C979-E0E4-5FA0-41A99110D2F8}"/>
+              </a:ext>
+            </a:extLst>
+          </p:cNvPr>
+          <p:cNvCxnSpPr>
+            <a:cxnSpLocks/>
+            <a:stCxn id="2" idx="3"/>
+            <a:endCxn id="70" idx="1"/>
+          </p:cNvCxnSpPr>
+          <p:nvPr/>
+        </p:nvCxnSpPr>
+        <p:spPr>
+          <a:xfrm>
+            <a:off x="1579418" y="3173895"/>
+            <a:ext cx="341164" cy="0"/>
+          </a:xfrm>
+          <a:prstGeom prst="straightConnector1">
+            <a:avLst/>
+          </a:prstGeom>
+          <a:ln>
+            <a:tailEnd type="triangle"/>
+          </a:ln>
+        </p:spPr>
+        <p:style>
+          <a:lnRef idx="1">
+            <a:schemeClr val="dk1"/>
+          </a:lnRef>
+          <a:fillRef idx="0">
+            <a:schemeClr val="dk1"/>
+          </a:fillRef>
+          <a:effectRef idx="0">
+            <a:schemeClr val="dk1"/>
           </a:effectRef>
           <a:fontRef idx="minor">
             <a:schemeClr val="tx1"/>

</xml_diff>

<commit_message>
adding volatility-based labeling technique (#17)
</commit_message>
<xml_diff>
--- a/assets/diagrams.pptx
+++ b/assets/diagrams.pptx
@@ -3415,7 +3415,7 @@
         </p:nvSpPr>
         <p:spPr>
           <a:xfrm>
-            <a:off x="4260273" y="2201142"/>
+            <a:off x="5839691" y="2092037"/>
             <a:ext cx="1835727" cy="2172150"/>
           </a:xfrm>
           <a:prstGeom prst="rect">
@@ -3459,8 +3459,8 @@
         </p:nvSpPr>
         <p:spPr>
           <a:xfrm>
-            <a:off x="2327564" y="2234047"/>
-            <a:ext cx="1427017" cy="2130135"/>
+            <a:off x="1745672" y="2124942"/>
+            <a:ext cx="3588328" cy="2130135"/>
           </a:xfrm>
           <a:prstGeom prst="rect">
             <a:avLst/>
@@ -3503,7 +3503,7 @@
         </p:nvSpPr>
         <p:spPr>
           <a:xfrm>
-            <a:off x="360218" y="2951019"/>
+            <a:off x="96981" y="2934904"/>
             <a:ext cx="1482437" cy="477982"/>
           </a:xfrm>
           <a:prstGeom prst="roundRect">
@@ -3550,7 +3550,7 @@
         </p:nvSpPr>
         <p:spPr>
           <a:xfrm>
-            <a:off x="2455721" y="2473038"/>
+            <a:off x="4035139" y="2363933"/>
             <a:ext cx="1104898" cy="477982"/>
           </a:xfrm>
           <a:prstGeom prst="roundRect">
@@ -3594,15 +3594,15 @@
           </p:cNvPr>
           <p:cNvCxnSpPr>
             <a:cxnSpLocks/>
-            <a:stCxn id="2" idx="3"/>
+            <a:stCxn id="70" idx="3"/>
             <a:endCxn id="3" idx="1"/>
           </p:cNvCxnSpPr>
           <p:nvPr/>
         </p:nvCxnSpPr>
         <p:spPr>
           <a:xfrm flipV="1">
-            <a:off x="1842655" y="2712029"/>
-            <a:ext cx="613066" cy="477981"/>
+            <a:off x="3628157" y="2602924"/>
+            <a:ext cx="406982" cy="570971"/>
           </a:xfrm>
           <a:prstGeom prst="straightConnector1">
             <a:avLst/>
@@ -3640,7 +3640,7 @@
         </p:nvSpPr>
         <p:spPr>
           <a:xfrm>
-            <a:off x="2466110" y="3667990"/>
+            <a:off x="4045528" y="3558885"/>
             <a:ext cx="1104899" cy="477982"/>
           </a:xfrm>
           <a:prstGeom prst="roundRect">
@@ -3684,15 +3684,15 @@
           </p:cNvPr>
           <p:cNvCxnSpPr>
             <a:cxnSpLocks/>
-            <a:stCxn id="2" idx="3"/>
+            <a:stCxn id="70" idx="3"/>
             <a:endCxn id="6" idx="1"/>
           </p:cNvCxnSpPr>
           <p:nvPr/>
         </p:nvCxnSpPr>
         <p:spPr>
           <a:xfrm>
-            <a:off x="1842655" y="3190010"/>
-            <a:ext cx="623455" cy="716971"/>
+            <a:off x="3628157" y="3173895"/>
+            <a:ext cx="417371" cy="623981"/>
           </a:xfrm>
           <a:prstGeom prst="straightConnector1">
             <a:avLst/>
@@ -3730,8 +3730,8 @@
         </p:nvSpPr>
         <p:spPr>
           <a:xfrm>
-            <a:off x="2251362" y="1652703"/>
-            <a:ext cx="1579419" cy="646331"/>
+            <a:off x="1745672" y="1478611"/>
+            <a:ext cx="3588328" cy="646331"/>
           </a:xfrm>
           <a:prstGeom prst="rect">
             <a:avLst/>
@@ -3773,7 +3773,7 @@
         </p:nvSpPr>
         <p:spPr>
           <a:xfrm>
-            <a:off x="4412672" y="2380725"/>
+            <a:off x="5992090" y="2271620"/>
             <a:ext cx="1433946" cy="477982"/>
           </a:xfrm>
           <a:prstGeom prst="roundRect">
@@ -3824,8 +3824,8 @@
         </p:nvCxnSpPr>
         <p:spPr>
           <a:xfrm flipV="1">
-            <a:off x="3754581" y="3287217"/>
-            <a:ext cx="505692" cy="11898"/>
+            <a:off x="5334000" y="3178112"/>
+            <a:ext cx="505691" cy="11898"/>
           </a:xfrm>
           <a:prstGeom prst="straightConnector1">
             <a:avLst/>
@@ -3863,7 +3863,7 @@
         </p:nvSpPr>
         <p:spPr>
           <a:xfrm>
-            <a:off x="6525492" y="3048226"/>
+            <a:off x="8104910" y="2939121"/>
             <a:ext cx="1704109" cy="477982"/>
           </a:xfrm>
           <a:prstGeom prst="roundRect">
@@ -3910,7 +3910,7 @@
         </p:nvSpPr>
         <p:spPr>
           <a:xfrm>
-            <a:off x="4412672" y="3070627"/>
+            <a:off x="5992090" y="2961522"/>
             <a:ext cx="1447801" cy="477982"/>
           </a:xfrm>
           <a:prstGeom prst="roundRect">
@@ -3957,7 +3957,7 @@
         </p:nvSpPr>
         <p:spPr>
           <a:xfrm>
-            <a:off x="4426526" y="3721676"/>
+            <a:off x="6005944" y="3612571"/>
             <a:ext cx="1447801" cy="477982"/>
           </a:xfrm>
           <a:prstGeom prst="roundRect">
@@ -4004,7 +4004,7 @@
         </p:nvSpPr>
         <p:spPr>
           <a:xfrm>
-            <a:off x="4260273" y="1828121"/>
+            <a:off x="5839691" y="1719016"/>
             <a:ext cx="1835727" cy="369332"/>
           </a:xfrm>
           <a:prstGeom prst="rect">
@@ -4040,7 +4040,7 @@
         </p:nvSpPr>
         <p:spPr>
           <a:xfrm>
-            <a:off x="4260272" y="4666834"/>
+            <a:off x="5839690" y="4557729"/>
             <a:ext cx="1835728" cy="477982"/>
           </a:xfrm>
           <a:prstGeom prst="roundRect">
@@ -4091,7 +4091,7 @@
         </p:nvCxnSpPr>
         <p:spPr>
           <a:xfrm flipV="1">
-            <a:off x="5178136" y="4373292"/>
+            <a:off x="6757554" y="4264187"/>
             <a:ext cx="1" cy="293542"/>
           </a:xfrm>
           <a:prstGeom prst="straightConnector1">
@@ -4140,7 +4140,7 @@
         </p:nvCxnSpPr>
         <p:spPr>
           <a:xfrm>
-            <a:off x="6096000" y="3287217"/>
+            <a:off x="7675418" y="3178112"/>
             <a:ext cx="429492" cy="0"/>
           </a:xfrm>
           <a:prstGeom prst="straightConnector1">
@@ -4179,7 +4179,7 @@
         </p:nvSpPr>
         <p:spPr>
           <a:xfrm>
-            <a:off x="8659093" y="3048226"/>
+            <a:off x="10238511" y="2939121"/>
             <a:ext cx="1704109" cy="477982"/>
           </a:xfrm>
           <a:prstGeom prst="roundRect">
@@ -4230,7 +4230,7 @@
         </p:nvCxnSpPr>
         <p:spPr>
           <a:xfrm>
-            <a:off x="8229601" y="3287217"/>
+            <a:off x="9809019" y="3178112"/>
             <a:ext cx="429492" cy="0"/>
           </a:xfrm>
           <a:prstGeom prst="straightConnector1">
@@ -4269,7 +4269,7 @@
         </p:nvSpPr>
         <p:spPr>
           <a:xfrm>
-            <a:off x="2327564" y="4666834"/>
+            <a:off x="2060860" y="4557729"/>
             <a:ext cx="1427017" cy="477982"/>
           </a:xfrm>
           <a:prstGeom prst="roundRect">
@@ -4314,14 +4314,14 @@
           <p:cNvCxnSpPr>
             <a:cxnSpLocks/>
             <a:stCxn id="62" idx="0"/>
-            <a:endCxn id="12" idx="2"/>
+            <a:endCxn id="70" idx="2"/>
           </p:cNvCxnSpPr>
           <p:nvPr/>
         </p:nvCxnSpPr>
         <p:spPr>
           <a:xfrm flipV="1">
-            <a:off x="3041073" y="4364182"/>
-            <a:ext cx="0" cy="302652"/>
+            <a:off x="2774369" y="3412886"/>
+            <a:ext cx="1" cy="1144843"/>
           </a:xfrm>
           <a:prstGeom prst="straightConnector1">
             <a:avLst/>
@@ -4345,6 +4345,96 @@
           </a:fillRef>
           <a:effectRef idx="0">
             <a:scrgbClr r="0" g="0" b="0"/>
+          </a:effectRef>
+          <a:fontRef idx="minor">
+            <a:schemeClr val="tx1"/>
+          </a:fontRef>
+        </p:style>
+      </p:cxnSp>
+      <p:sp>
+        <p:nvSpPr>
+          <p:cNvPr id="70" name="Rounded Rectangle 69">
+            <a:extLst>
+              <a:ext uri="{FF2B5EF4-FFF2-40B4-BE49-F238E27FC236}">
+                <a16:creationId xmlns:a16="http://schemas.microsoft.com/office/drawing/2014/main" id="{D5BBB476-D862-9630-98F3-CD1D1238A3CA}"/>
+              </a:ext>
+            </a:extLst>
+          </p:cNvPr>
+          <p:cNvSpPr/>
+          <p:nvPr/>
+        </p:nvSpPr>
+        <p:spPr>
+          <a:xfrm>
+            <a:off x="1920582" y="2934904"/>
+            <a:ext cx="1707575" cy="477982"/>
+          </a:xfrm>
+          <a:prstGeom prst="roundRect">
+            <a:avLst/>
+          </a:prstGeom>
+        </p:spPr>
+        <p:style>
+          <a:lnRef idx="1">
+            <a:schemeClr val="accent3"/>
+          </a:lnRef>
+          <a:fillRef idx="2">
+            <a:schemeClr val="accent3"/>
+          </a:fillRef>
+          <a:effectRef idx="1">
+            <a:schemeClr val="accent3"/>
+          </a:effectRef>
+          <a:fontRef idx="minor">
+            <a:schemeClr val="dk1"/>
+          </a:fontRef>
+        </p:style>
+        <p:txBody>
+          <a:bodyPr rtlCol="0" anchor="ctr"/>
+          <a:lstStyle/>
+          <a:p>
+            <a:pPr algn="ctr"/>
+            <a:r>
+              <a:rPr lang="en-BR" dirty="0"/>
+              <a:t>Data standardization</a:t>
+            </a:r>
+          </a:p>
+        </p:txBody>
+      </p:sp>
+      <p:cxnSp>
+        <p:nvCxnSpPr>
+          <p:cNvPr id="76" name="Straight Arrow Connector 75">
+            <a:extLst>
+              <a:ext uri="{FF2B5EF4-FFF2-40B4-BE49-F238E27FC236}">
+                <a16:creationId xmlns:a16="http://schemas.microsoft.com/office/drawing/2014/main" id="{32DBE37E-C979-E0E4-5FA0-41A99110D2F8}"/>
+              </a:ext>
+            </a:extLst>
+          </p:cNvPr>
+          <p:cNvCxnSpPr>
+            <a:cxnSpLocks/>
+            <a:stCxn id="2" idx="3"/>
+            <a:endCxn id="70" idx="1"/>
+          </p:cNvCxnSpPr>
+          <p:nvPr/>
+        </p:nvCxnSpPr>
+        <p:spPr>
+          <a:xfrm>
+            <a:off x="1579418" y="3173895"/>
+            <a:ext cx="341164" cy="0"/>
+          </a:xfrm>
+          <a:prstGeom prst="straightConnector1">
+            <a:avLst/>
+          </a:prstGeom>
+          <a:ln>
+            <a:tailEnd type="triangle"/>
+          </a:ln>
+        </p:spPr>
+        <p:style>
+          <a:lnRef idx="1">
+            <a:schemeClr val="dk1"/>
+          </a:lnRef>
+          <a:fillRef idx="0">
+            <a:schemeClr val="dk1"/>
+          </a:fillRef>
+          <a:effectRef idx="0">
+            <a:schemeClr val="dk1"/>
           </a:effectRef>
           <a:fontRef idx="minor">
             <a:schemeClr val="tx1"/>

</xml_diff>

<commit_message>
Feature/benchm tf dataset (#51)
* notebooks and assets

* adding new data set for benchmark
</commit_message>
<xml_diff>
--- a/assets/diagrams.pptx
+++ b/assets/diagrams.pptx
@@ -264,7 +264,7 @@
           <a:p>
             <a:fld id="{B9DCAE00-9EC7-B94C-AB12-FE2BB94F5C60}" type="datetimeFigureOut">
               <a:rPr lang="en-BR" smtClean="0"/>
-              <a:t>28/03/23</a:t>
+              <a:t>08/05/23</a:t>
             </a:fld>
             <a:endParaRPr lang="en-BR"/>
           </a:p>
@@ -464,7 +464,7 @@
           <a:p>
             <a:fld id="{B9DCAE00-9EC7-B94C-AB12-FE2BB94F5C60}" type="datetimeFigureOut">
               <a:rPr lang="en-BR" smtClean="0"/>
-              <a:t>28/03/23</a:t>
+              <a:t>08/05/23</a:t>
             </a:fld>
             <a:endParaRPr lang="en-BR"/>
           </a:p>
@@ -674,7 +674,7 @@
           <a:p>
             <a:fld id="{B9DCAE00-9EC7-B94C-AB12-FE2BB94F5C60}" type="datetimeFigureOut">
               <a:rPr lang="en-BR" smtClean="0"/>
-              <a:t>28/03/23</a:t>
+              <a:t>08/05/23</a:t>
             </a:fld>
             <a:endParaRPr lang="en-BR"/>
           </a:p>
@@ -874,7 +874,7 @@
           <a:p>
             <a:fld id="{B9DCAE00-9EC7-B94C-AB12-FE2BB94F5C60}" type="datetimeFigureOut">
               <a:rPr lang="en-BR" smtClean="0"/>
-              <a:t>28/03/23</a:t>
+              <a:t>08/05/23</a:t>
             </a:fld>
             <a:endParaRPr lang="en-BR"/>
           </a:p>
@@ -1150,7 +1150,7 @@
           <a:p>
             <a:fld id="{B9DCAE00-9EC7-B94C-AB12-FE2BB94F5C60}" type="datetimeFigureOut">
               <a:rPr lang="en-BR" smtClean="0"/>
-              <a:t>28/03/23</a:t>
+              <a:t>08/05/23</a:t>
             </a:fld>
             <a:endParaRPr lang="en-BR"/>
           </a:p>
@@ -1418,7 +1418,7 @@
           <a:p>
             <a:fld id="{B9DCAE00-9EC7-B94C-AB12-FE2BB94F5C60}" type="datetimeFigureOut">
               <a:rPr lang="en-BR" smtClean="0"/>
-              <a:t>28/03/23</a:t>
+              <a:t>08/05/23</a:t>
             </a:fld>
             <a:endParaRPr lang="en-BR"/>
           </a:p>
@@ -1833,7 +1833,7 @@
           <a:p>
             <a:fld id="{B9DCAE00-9EC7-B94C-AB12-FE2BB94F5C60}" type="datetimeFigureOut">
               <a:rPr lang="en-BR" smtClean="0"/>
-              <a:t>28/03/23</a:t>
+              <a:t>08/05/23</a:t>
             </a:fld>
             <a:endParaRPr lang="en-BR"/>
           </a:p>
@@ -1975,7 +1975,7 @@
           <a:p>
             <a:fld id="{B9DCAE00-9EC7-B94C-AB12-FE2BB94F5C60}" type="datetimeFigureOut">
               <a:rPr lang="en-BR" smtClean="0"/>
-              <a:t>28/03/23</a:t>
+              <a:t>08/05/23</a:t>
             </a:fld>
             <a:endParaRPr lang="en-BR"/>
           </a:p>
@@ -2088,7 +2088,7 @@
           <a:p>
             <a:fld id="{B9DCAE00-9EC7-B94C-AB12-FE2BB94F5C60}" type="datetimeFigureOut">
               <a:rPr lang="en-BR" smtClean="0"/>
-              <a:t>28/03/23</a:t>
+              <a:t>08/05/23</a:t>
             </a:fld>
             <a:endParaRPr lang="en-BR"/>
           </a:p>
@@ -2401,7 +2401,7 @@
           <a:p>
             <a:fld id="{B9DCAE00-9EC7-B94C-AB12-FE2BB94F5C60}" type="datetimeFigureOut">
               <a:rPr lang="en-BR" smtClean="0"/>
-              <a:t>28/03/23</a:t>
+              <a:t>08/05/23</a:t>
             </a:fld>
             <a:endParaRPr lang="en-BR"/>
           </a:p>
@@ -2690,7 +2690,7 @@
           <a:p>
             <a:fld id="{B9DCAE00-9EC7-B94C-AB12-FE2BB94F5C60}" type="datetimeFigureOut">
               <a:rPr lang="en-BR" smtClean="0"/>
-              <a:t>28/03/23</a:t>
+              <a:t>08/05/23</a:t>
             </a:fld>
             <a:endParaRPr lang="en-BR"/>
           </a:p>
@@ -2933,7 +2933,7 @@
           <a:p>
             <a:fld id="{B9DCAE00-9EC7-B94C-AB12-FE2BB94F5C60}" type="datetimeFigureOut">
               <a:rPr lang="en-BR" smtClean="0"/>
-              <a:t>28/03/23</a:t>
+              <a:t>08/05/23</a:t>
             </a:fld>
             <a:endParaRPr lang="en-BR"/>
           </a:p>
@@ -4193,7 +4193,7 @@
         </p:nvSpPr>
         <p:spPr>
           <a:xfrm>
-            <a:off x="9272163" y="2939121"/>
+            <a:off x="9675924" y="2363933"/>
             <a:ext cx="1229591" cy="477982"/>
           </a:xfrm>
           <a:prstGeom prst="roundRect">
@@ -4243,9 +4243,9 @@
           <p:nvPr/>
         </p:nvCxnSpPr>
         <p:spPr>
-          <a:xfrm>
-            <a:off x="8849587" y="3178112"/>
-            <a:ext cx="422576" cy="0"/>
+          <a:xfrm flipV="1">
+            <a:off x="8849587" y="2602924"/>
+            <a:ext cx="826337" cy="575188"/>
           </a:xfrm>
           <a:prstGeom prst="straightConnector1">
             <a:avLst/>
@@ -4469,7 +4469,7 @@
         </p:nvSpPr>
         <p:spPr>
           <a:xfrm>
-            <a:off x="10924330" y="2945070"/>
+            <a:off x="9675923" y="3413412"/>
             <a:ext cx="1229592" cy="477982"/>
           </a:xfrm>
           <a:prstGeom prst="roundRect">
@@ -4504,24 +4504,24 @@
       </p:sp>
       <p:cxnSp>
         <p:nvCxnSpPr>
-          <p:cNvPr id="32" name="Straight Arrow Connector 31">
-            <a:extLst>
-              <a:ext uri="{FF2B5EF4-FFF2-40B4-BE49-F238E27FC236}">
-                <a16:creationId xmlns:a16="http://schemas.microsoft.com/office/drawing/2014/main" id="{F933065B-07AA-843D-4E33-F5EE2494F21F}"/>
+          <p:cNvPr id="9" name="Straight Arrow Connector 8">
+            <a:extLst>
+              <a:ext uri="{FF2B5EF4-FFF2-40B4-BE49-F238E27FC236}">
+                <a16:creationId xmlns:a16="http://schemas.microsoft.com/office/drawing/2014/main" id="{916B4D06-73BA-27EA-0884-F281E2252E9C}"/>
               </a:ext>
             </a:extLst>
           </p:cNvPr>
           <p:cNvCxnSpPr>
             <a:cxnSpLocks/>
-            <a:stCxn id="33" idx="3"/>
+            <a:stCxn id="19" idx="3"/>
             <a:endCxn id="25" idx="1"/>
           </p:cNvCxnSpPr>
           <p:nvPr/>
         </p:nvCxnSpPr>
         <p:spPr>
           <a:xfrm>
-            <a:off x="10501754" y="3178112"/>
-            <a:ext cx="422576" cy="5949"/>
+            <a:off x="8849587" y="3178112"/>
+            <a:ext cx="826336" cy="474291"/>
           </a:xfrm>
           <a:prstGeom prst="straightConnector1">
             <a:avLst/>

</xml_diff>